<commit_message>
Update DMS Architecture figures to reflect new application layer structure.
</commit_message>
<xml_diff>
--- a/figures/DMS-Architecture.pptx
+++ b/figures/DMS-Architecture.pptx
@@ -208,7 +208,7 @@
           <a:p>
             <a:fld id="{DBAC7EBA-AB40-9047-8B6A-F6C983C75F64}" type="datetimeFigureOut">
               <a:rPr lang="en-US" smtClean="0"/>
-              <a:t>10/23/15</a:t>
+              <a:t>5/31/2016</a:t>
             </a:fld>
             <a:endParaRPr lang="en-US"/>
           </a:p>
@@ -3162,7 +3162,7 @@
         </p:nvSpPr>
         <p:spPr bwMode="auto">
           <a:xfrm>
-            <a:off x="4591050" y="3160833"/>
+            <a:off x="4404680" y="3206966"/>
             <a:ext cx="2314575" cy="715962"/>
           </a:xfrm>
           <a:prstGeom prst="rect">
@@ -3225,7 +3225,7 @@
         </p:nvSpPr>
         <p:spPr bwMode="auto">
           <a:xfrm>
-            <a:off x="6905625" y="3160833"/>
+            <a:off x="6719255" y="3206966"/>
             <a:ext cx="2184400" cy="715962"/>
           </a:xfrm>
           <a:prstGeom prst="rect">
@@ -3288,7 +3288,7 @@
         </p:nvSpPr>
         <p:spPr bwMode="auto">
           <a:xfrm>
-            <a:off x="4592638" y="3875208"/>
+            <a:off x="4406268" y="3921341"/>
             <a:ext cx="4498975" cy="782637"/>
           </a:xfrm>
           <a:prstGeom prst="rect">
@@ -3363,7 +3363,7 @@
         </p:nvSpPr>
         <p:spPr bwMode="auto">
           <a:xfrm>
-            <a:off x="7561263" y="4756150"/>
+            <a:off x="7371717" y="4789594"/>
             <a:ext cx="1517650" cy="1028700"/>
           </a:xfrm>
           <a:prstGeom prst="rect">
@@ -3438,7 +3438,7 @@
         </p:nvSpPr>
         <p:spPr bwMode="auto">
           <a:xfrm>
-            <a:off x="4594225" y="5784850"/>
+            <a:off x="4404679" y="5818294"/>
             <a:ext cx="4484688" cy="339725"/>
           </a:xfrm>
           <a:prstGeom prst="rect">
@@ -3489,7 +3489,7 @@
         </p:nvSpPr>
         <p:spPr bwMode="auto">
           <a:xfrm>
-            <a:off x="6043613" y="4756150"/>
+            <a:off x="5854067" y="4789594"/>
             <a:ext cx="1517650" cy="1028700"/>
           </a:xfrm>
           <a:prstGeom prst="rect">
@@ -3553,7 +3553,7 @@
         <p:spPr bwMode="auto">
           <a:xfrm>
             <a:off x="185738" y="792432"/>
-            <a:ext cx="4621212" cy="1814513"/>
+            <a:ext cx="4056748" cy="2062103"/>
           </a:xfrm>
           <a:prstGeom prst="rect">
             <a:avLst/>
@@ -3567,7 +3567,7 @@
           </a:ln>
         </p:spPr>
         <p:txBody>
-          <a:bodyPr wrap="none">
+          <a:bodyPr wrap="square">
             <a:spAutoFit/>
           </a:bodyPr>
           <a:lstStyle/>
@@ -3616,19 +3616,16 @@
                 </a:solidFill>
                 <a:latin typeface="Calibri"/>
               </a:rPr>
-              <a:t>Pipelines constructed from reusable,</a:t>
-            </a:r>
-          </a:p>
-          <a:p>
-            <a:pPr marL="176213" indent="-176213"/>
-            <a:r>
-              <a:rPr lang="en-US" sz="1600" dirty="0">
-                <a:solidFill>
-                  <a:prstClr val="black"/>
-                </a:solidFill>
-                <a:latin typeface="Calibri"/>
-              </a:rPr>
-              <a:t>    standard “parts”, i.e. Application Framework</a:t>
+              <a:t>Pipelines constructed from </a:t>
+            </a:r>
+            <a:r>
+              <a:rPr lang="en-US" sz="1600" dirty="0" smtClean="0">
+                <a:solidFill>
+                  <a:prstClr val="black"/>
+                </a:solidFill>
+                <a:latin typeface="Calibri"/>
+              </a:rPr>
+              <a:t>reusable Algorithmic Components</a:t>
             </a:r>
           </a:p>
           <a:p>
@@ -3637,14 +3634,38 @@
               <a:buChar char="•"/>
             </a:pPr>
             <a:r>
+              <a:rPr lang="en-US" sz="1600" dirty="0" smtClean="0">
+                <a:solidFill>
+                  <a:prstClr val="black"/>
+                </a:solidFill>
+                <a:latin typeface="Calibri"/>
+              </a:rPr>
+              <a:t>Data </a:t>
+            </a:r>
+            <a:r>
               <a:rPr lang="en-US" sz="1600" dirty="0">
                 <a:solidFill>
                   <a:prstClr val="black"/>
                 </a:solidFill>
                 <a:latin typeface="Calibri"/>
               </a:rPr>
-              <a:t>Data Products representations standardized</a:t>
-            </a:r>
+              <a:t>Products </a:t>
+            </a:r>
+            <a:r>
+              <a:rPr lang="en-US" sz="1600" dirty="0" smtClean="0">
+                <a:solidFill>
+                  <a:prstClr val="black"/>
+                </a:solidFill>
+                <a:latin typeface="Calibri"/>
+              </a:rPr>
+              <a:t>represented by Shared Software Primitives</a:t>
+            </a:r>
+            <a:endParaRPr lang="en-US" sz="1600" dirty="0">
+              <a:solidFill>
+                <a:prstClr val="black"/>
+              </a:solidFill>
+              <a:latin typeface="Calibri"/>
+            </a:endParaRPr>
           </a:p>
           <a:p>
             <a:pPr marL="176213" indent="-176213">
@@ -3652,28 +3673,22 @@
               <a:buChar char="•"/>
             </a:pPr>
             <a:r>
+              <a:rPr lang="en-US" sz="1600" dirty="0" smtClean="0">
+                <a:solidFill>
+                  <a:prstClr val="black"/>
+                </a:solidFill>
+                <a:latin typeface="Calibri"/>
+              </a:rPr>
+              <a:t>Object-oriented</a:t>
+            </a:r>
+            <a:r>
               <a:rPr lang="en-US" sz="1600" dirty="0">
                 <a:solidFill>
                   <a:prstClr val="black"/>
                 </a:solidFill>
                 <a:latin typeface="Calibri"/>
               </a:rPr>
-              <a:t>Metadata extendable without schema change</a:t>
-            </a:r>
-          </a:p>
-          <a:p>
-            <a:pPr marL="176213" indent="-176213">
-              <a:buFont typeface="Times New Roman" pitchFamily="18" charset="0"/>
-              <a:buChar char="•"/>
-            </a:pPr>
-            <a:r>
-              <a:rPr lang="en-US" sz="1600" dirty="0">
-                <a:solidFill>
-                  <a:prstClr val="black"/>
-                </a:solidFill>
-                <a:latin typeface="Calibri"/>
-              </a:rPr>
-              <a:t>Object-oriented, python, C++ Custom Software</a:t>
+              <a:t>, python, C++ Custom Software</a:t>
             </a:r>
           </a:p>
         </p:txBody>
@@ -3688,7 +3703,7 @@
         </p:nvSpPr>
         <p:spPr bwMode="auto">
           <a:xfrm>
-            <a:off x="152400" y="2739306"/>
+            <a:off x="152400" y="2813198"/>
             <a:ext cx="4252279" cy="1816100"/>
           </a:xfrm>
           <a:prstGeom prst="rect">
@@ -3953,369 +3968,9 @@
           </a:p>
         </p:txBody>
       </p:sp>
-      <p:grpSp>
-        <p:nvGrpSpPr>
-          <p:cNvPr id="2" name="Group 24"/>
-          <p:cNvGrpSpPr>
-            <a:grpSpLocks/>
-          </p:cNvGrpSpPr>
-          <p:nvPr/>
-        </p:nvGrpSpPr>
-        <p:grpSpPr bwMode="auto">
-          <a:xfrm>
-            <a:off x="4584700" y="933630"/>
-            <a:ext cx="4494213" cy="2141538"/>
-            <a:chOff x="4649787" y="906191"/>
-            <a:chExt cx="4494213" cy="2142649"/>
-          </a:xfrm>
-          <a:solidFill>
-            <a:schemeClr val="tx2">
-              <a:lumMod val="40000"/>
-              <a:lumOff val="60000"/>
-            </a:schemeClr>
-          </a:solidFill>
-        </p:grpSpPr>
-        <p:grpSp>
-          <p:nvGrpSpPr>
-            <p:cNvPr id="3" name="Group 1094"/>
-            <p:cNvGrpSpPr>
-              <a:grpSpLocks/>
-            </p:cNvGrpSpPr>
-            <p:nvPr/>
-          </p:nvGrpSpPr>
-          <p:grpSpPr bwMode="auto">
-            <a:xfrm>
-              <a:off x="4652962" y="1668463"/>
-              <a:ext cx="4491038" cy="1380377"/>
-              <a:chOff x="2760" y="880"/>
-              <a:chExt cx="2829" cy="623"/>
-            </a:xfrm>
-            <a:grpFill/>
-          </p:grpSpPr>
-          <p:sp>
-            <p:nvSpPr>
-              <p:cNvPr id="27664" name="Rectangle 1068"/>
-              <p:cNvSpPr>
-                <a:spLocks noChangeArrowheads="1"/>
-              </p:cNvSpPr>
-              <p:nvPr/>
-            </p:nvSpPr>
-            <p:spPr bwMode="auto">
-              <a:xfrm>
-                <a:off x="2760" y="880"/>
-                <a:ext cx="1382" cy="411"/>
-              </a:xfrm>
-              <a:prstGeom prst="rect">
-                <a:avLst/>
-              </a:prstGeom>
-              <a:grpFill/>
-              <a:ln w="9525">
-                <a:solidFill>
-                  <a:schemeClr val="tx1"/>
-                </a:solidFill>
-                <a:miter lim="800000"/>
-                <a:headEnd/>
-                <a:tailEnd/>
-              </a:ln>
-            </p:spPr>
-            <p:txBody>
-              <a:bodyPr wrap="none" anchor="ctr"/>
-              <a:lstStyle/>
-              <a:p>
-                <a:pPr algn="ctr"/>
-                <a:r>
-                  <a:rPr lang="en-US" sz="1200" b="1" dirty="0">
-                    <a:solidFill>
-                      <a:prstClr val="black"/>
-                    </a:solidFill>
-                    <a:latin typeface="Calibri"/>
-                  </a:rPr>
-                  <a:t> 02C.06.01</a:t>
-                </a:r>
-              </a:p>
-              <a:p>
-                <a:pPr algn="ctr"/>
-                <a:r>
-                  <a:rPr lang="en-US" sz="1200" b="1" dirty="0">
-                    <a:solidFill>
-                      <a:prstClr val="black"/>
-                    </a:solidFill>
-                    <a:latin typeface="Calibri"/>
-                  </a:rPr>
-                  <a:t>Science Data Archive</a:t>
-                </a:r>
-              </a:p>
-              <a:p>
-                <a:pPr algn="ctr"/>
-                <a:r>
-                  <a:rPr lang="en-US" sz="1200" b="1" dirty="0">
-                    <a:solidFill>
-                      <a:prstClr val="black"/>
-                    </a:solidFill>
-                    <a:latin typeface="Calibri"/>
-                  </a:rPr>
-                  <a:t>(Images, Alerts, Catalogs)</a:t>
-                </a:r>
-                <a:endParaRPr lang="en-US" sz="1600" dirty="0">
-                  <a:solidFill>
-                    <a:prstClr val="black"/>
-                  </a:solidFill>
-                  <a:latin typeface="Calibri"/>
-                </a:endParaRPr>
-              </a:p>
-            </p:txBody>
-          </p:sp>
-          <p:sp>
-            <p:nvSpPr>
-              <p:cNvPr id="27665" name="Rectangle 1069"/>
-              <p:cNvSpPr>
-                <a:spLocks noChangeArrowheads="1"/>
-              </p:cNvSpPr>
-              <p:nvPr/>
-            </p:nvSpPr>
-            <p:spPr bwMode="auto">
-              <a:xfrm>
-                <a:off x="4142" y="880"/>
-                <a:ext cx="1444" cy="411"/>
-              </a:xfrm>
-              <a:prstGeom prst="rect">
-                <a:avLst/>
-              </a:prstGeom>
-              <a:grpFill/>
-              <a:ln w="9525">
-                <a:solidFill>
-                  <a:schemeClr val="tx1"/>
-                </a:solidFill>
-                <a:miter lim="800000"/>
-                <a:headEnd/>
-                <a:tailEnd/>
-              </a:ln>
-            </p:spPr>
-            <p:txBody>
-              <a:bodyPr wrap="none" anchor="ctr"/>
-              <a:lstStyle/>
-              <a:p>
-                <a:pPr algn="ctr"/>
-                <a:r>
-                  <a:rPr lang="en-US" sz="1100" b="1" dirty="0">
-                    <a:solidFill>
-                      <a:prstClr val="black"/>
-                    </a:solidFill>
-                    <a:latin typeface="Calibri"/>
-                  </a:rPr>
-                  <a:t> 02C.01.02.01, 02C.02.01.04,</a:t>
-                </a:r>
-              </a:p>
-              <a:p>
-                <a:pPr algn="ctr"/>
-                <a:r>
-                  <a:rPr lang="en-US" sz="1100" b="1" dirty="0">
-                    <a:solidFill>
-                      <a:prstClr val="black"/>
-                    </a:solidFill>
-                    <a:latin typeface="Calibri"/>
-                  </a:rPr>
-                  <a:t> 02C.03, 02C.04</a:t>
-                </a:r>
-              </a:p>
-              <a:p>
-                <a:pPr algn="ctr"/>
-                <a:r>
-                  <a:rPr lang="en-US" sz="1100" b="1" dirty="0">
-                    <a:solidFill>
-                      <a:prstClr val="black"/>
-                    </a:solidFill>
-                    <a:latin typeface="Calibri"/>
-                  </a:rPr>
-                  <a:t>Alert, SDQA, Calibration, </a:t>
-                </a:r>
-              </a:p>
-              <a:p>
-                <a:pPr algn="ctr"/>
-                <a:r>
-                  <a:rPr lang="en-US" sz="1100" b="1" dirty="0">
-                    <a:solidFill>
-                      <a:prstClr val="black"/>
-                    </a:solidFill>
-                    <a:latin typeface="Calibri"/>
-                  </a:rPr>
-                  <a:t>Data Release </a:t>
-                </a:r>
-              </a:p>
-              <a:p>
-                <a:pPr algn="ctr"/>
-                <a:r>
-                  <a:rPr lang="en-US" sz="1100" b="1" dirty="0">
-                    <a:solidFill>
-                      <a:prstClr val="black"/>
-                    </a:solidFill>
-                    <a:latin typeface="Calibri"/>
-                  </a:rPr>
-                  <a:t>Productions/Pipelines</a:t>
-                </a:r>
-                <a:endParaRPr lang="en-US" sz="1400" dirty="0">
-                  <a:solidFill>
-                    <a:prstClr val="black"/>
-                  </a:solidFill>
-                  <a:latin typeface="Calibri"/>
-                </a:endParaRPr>
-              </a:p>
-            </p:txBody>
-          </p:sp>
-          <p:sp>
-            <p:nvSpPr>
-              <p:cNvPr id="27666" name="Rectangle 1070"/>
-              <p:cNvSpPr>
-                <a:spLocks noChangeArrowheads="1"/>
-              </p:cNvSpPr>
-              <p:nvPr/>
-            </p:nvSpPr>
-            <p:spPr bwMode="auto">
-              <a:xfrm>
-                <a:off x="2761" y="1288"/>
-                <a:ext cx="2828" cy="215"/>
-              </a:xfrm>
-              <a:prstGeom prst="rect">
-                <a:avLst/>
-              </a:prstGeom>
-              <a:grpFill/>
-              <a:ln w="9525">
-                <a:solidFill>
-                  <a:schemeClr val="tx1"/>
-                </a:solidFill>
-                <a:miter lim="800000"/>
-                <a:headEnd/>
-                <a:tailEnd/>
-              </a:ln>
-            </p:spPr>
-            <p:txBody>
-              <a:bodyPr wrap="none" anchor="ctr"/>
-              <a:lstStyle/>
-              <a:p>
-                <a:pPr algn="ctr"/>
-                <a:r>
-                  <a:rPr lang="en-US" sz="1200" b="1" dirty="0">
-                    <a:solidFill>
-                      <a:prstClr val="black"/>
-                    </a:solidFill>
-                    <a:latin typeface="Calibri"/>
-                  </a:rPr>
-                  <a:t> 02C.03.05, </a:t>
-                </a:r>
-                <a:r>
-                  <a:rPr lang="en-US" sz="1200" b="1" dirty="0" smtClean="0">
-                    <a:solidFill>
-                      <a:prstClr val="black"/>
-                    </a:solidFill>
-                    <a:latin typeface="Calibri"/>
-                  </a:rPr>
-                  <a:t>02C.04.01</a:t>
-                </a:r>
-                <a:endParaRPr lang="en-US" sz="1200" b="1" dirty="0">
-                  <a:solidFill>
-                    <a:prstClr val="black"/>
-                  </a:solidFill>
-                  <a:latin typeface="Calibri"/>
-                </a:endParaRPr>
-              </a:p>
-              <a:p>
-                <a:pPr algn="ctr"/>
-                <a:r>
-                  <a:rPr lang="en-US" sz="1200" b="1" dirty="0">
-                    <a:solidFill>
-                      <a:prstClr val="black"/>
-                    </a:solidFill>
-                    <a:latin typeface="Calibri"/>
-                  </a:rPr>
-                  <a:t>Application Framework</a:t>
-                </a:r>
-                <a:endParaRPr lang="en-US" sz="1600" dirty="0">
-                  <a:solidFill>
-                    <a:prstClr val="black"/>
-                  </a:solidFill>
-                  <a:latin typeface="Calibri"/>
-                </a:endParaRPr>
-              </a:p>
-            </p:txBody>
-          </p:sp>
-        </p:grpSp>
-        <p:sp>
-          <p:nvSpPr>
-            <p:cNvPr id="27663" name="Rectangle 1070"/>
-            <p:cNvSpPr>
-              <a:spLocks noChangeArrowheads="1"/>
-            </p:cNvSpPr>
-            <p:nvPr/>
-          </p:nvSpPr>
-          <p:spPr bwMode="auto">
-            <a:xfrm>
-              <a:off x="4649787" y="906191"/>
-              <a:ext cx="2197100" cy="762272"/>
-            </a:xfrm>
-            <a:prstGeom prst="rect">
-              <a:avLst/>
-            </a:prstGeom>
-            <a:grpFill/>
-            <a:ln w="9525">
-              <a:solidFill>
-                <a:schemeClr val="tx1"/>
-              </a:solidFill>
-              <a:miter lim="800000"/>
-              <a:headEnd/>
-              <a:tailEnd/>
-            </a:ln>
-          </p:spPr>
-          <p:txBody>
-            <a:bodyPr wrap="none" anchor="ctr"/>
-            <a:lstStyle/>
-            <a:p>
-              <a:pPr algn="ctr"/>
-              <a:r>
-                <a:rPr lang="en-US" sz="1200" b="1" dirty="0">
-                  <a:solidFill>
-                    <a:prstClr val="black"/>
-                  </a:solidFill>
-                  <a:latin typeface="Calibri"/>
-                </a:rPr>
-                <a:t> 02C.05</a:t>
-              </a:r>
-            </a:p>
-            <a:p>
-              <a:pPr algn="ctr"/>
-              <a:r>
-                <a:rPr lang="en-US" sz="1200" b="1" dirty="0">
-                  <a:solidFill>
-                    <a:prstClr val="black"/>
-                  </a:solidFill>
-                  <a:latin typeface="Calibri"/>
-                </a:rPr>
-                <a:t>Science User Interface </a:t>
-              </a:r>
-            </a:p>
-            <a:p>
-              <a:pPr algn="ctr"/>
-              <a:r>
-                <a:rPr lang="en-US" sz="1200" b="1" dirty="0">
-                  <a:solidFill>
-                    <a:prstClr val="black"/>
-                  </a:solidFill>
-                  <a:latin typeface="Calibri"/>
-                </a:rPr>
-                <a:t>and Analysis Tools</a:t>
-              </a:r>
-              <a:endParaRPr lang="en-US" sz="1600" dirty="0">
-                <a:solidFill>
-                  <a:prstClr val="black"/>
-                </a:solidFill>
-                <a:latin typeface="Calibri"/>
-              </a:endParaRPr>
-            </a:p>
-          </p:txBody>
-        </p:sp>
-      </p:grpSp>
-      <p:sp>
-        <p:nvSpPr>
-          <p:cNvPr id="27659" name="Rectangle 1080"/>
+      <p:sp>
+        <p:nvSpPr>
+          <p:cNvPr id="27664" name="Rectangle 1068"/>
           <p:cNvSpPr>
             <a:spLocks noChangeArrowheads="1"/>
           </p:cNvSpPr>
@@ -4323,113 +3978,8 @@
         </p:nvSpPr>
         <p:spPr bwMode="auto">
           <a:xfrm>
-            <a:off x="4594225" y="4752975"/>
-            <a:ext cx="1449388" cy="1031875"/>
-          </a:xfrm>
-          <a:prstGeom prst="rect">
-            <a:avLst/>
-          </a:prstGeom>
-          <a:solidFill>
-            <a:srgbClr val="FFF1BF"/>
-          </a:solidFill>
-          <a:ln w="9525">
-            <a:solidFill>
-              <a:schemeClr val="tx1"/>
-            </a:solidFill>
-            <a:miter lim="800000"/>
-            <a:headEnd/>
-            <a:tailEnd/>
-          </a:ln>
-        </p:spPr>
-        <p:txBody>
-          <a:bodyPr wrap="none" anchor="ctr"/>
-          <a:lstStyle/>
-          <a:p>
-            <a:pPr algn="ctr"/>
-            <a:r>
-              <a:rPr lang="en-US" sz="1200" b="1" dirty="0">
-                <a:solidFill>
-                  <a:prstClr val="black"/>
-                </a:solidFill>
-                <a:latin typeface="Calibri"/>
-              </a:rPr>
-              <a:t> 02C.07.04.01</a:t>
-            </a:r>
-          </a:p>
-          <a:p>
-            <a:pPr algn="ctr"/>
-            <a:r>
-              <a:rPr lang="en-US" sz="1200" b="1" dirty="0">
-                <a:solidFill>
-                  <a:prstClr val="black"/>
-                </a:solidFill>
-                <a:latin typeface="Calibri"/>
-              </a:rPr>
-              <a:t>Archive Site</a:t>
-            </a:r>
-            <a:endParaRPr lang="en-US" sz="1600" dirty="0">
-              <a:solidFill>
-                <a:prstClr val="black"/>
-              </a:solidFill>
-              <a:latin typeface="Calibri"/>
-            </a:endParaRPr>
-          </a:p>
-        </p:txBody>
-      </p:sp>
-      <p:sp>
-        <p:nvSpPr>
-          <p:cNvPr id="27661" name="TextBox 18"/>
-          <p:cNvSpPr txBox="1">
-            <a:spLocks noChangeArrowheads="1"/>
-          </p:cNvSpPr>
-          <p:nvPr/>
-        </p:nvSpPr>
-        <p:spPr bwMode="auto">
-          <a:xfrm>
-            <a:off x="6705600" y="6172200"/>
-            <a:ext cx="2492865" cy="246221"/>
-          </a:xfrm>
-          <a:prstGeom prst="rect">
-            <a:avLst/>
-          </a:prstGeom>
-          <a:noFill/>
-          <a:ln w="9525">
-            <a:noFill/>
-            <a:miter lim="800000"/>
-            <a:headEnd/>
-            <a:tailEnd/>
-          </a:ln>
-        </p:spPr>
-        <p:txBody>
-          <a:bodyPr wrap="none">
-            <a:spAutoFit/>
-          </a:bodyPr>
-          <a:lstStyle/>
-          <a:p>
-            <a:r>
-              <a:rPr lang="en-US" sz="1000" i="1" dirty="0">
-                <a:solidFill>
-                  <a:prstClr val="black"/>
-                </a:solidFill>
-                <a:latin typeface="Calibri" pitchFamily="34" charset="0"/>
-              </a:rPr>
-              <a:t>Data Management System Design LDM-148</a:t>
-            </a:r>
-          </a:p>
-        </p:txBody>
-      </p:sp>
-      <p:sp>
-        <p:nvSpPr>
-          <p:cNvPr id="20" name="Rectangle 1070"/>
-          <p:cNvSpPr>
-            <a:spLocks noChangeArrowheads="1"/>
-          </p:cNvSpPr>
-          <p:nvPr/>
-        </p:nvSpPr>
-        <p:spPr bwMode="auto">
-          <a:xfrm>
-            <a:off x="6781800" y="933630"/>
-            <a:ext cx="2293200" cy="761877"/>
+            <a:off x="4404680" y="1987806"/>
+            <a:ext cx="1738894" cy="669738"/>
           </a:xfrm>
           <a:prstGeom prst="rect">
             <a:avLst/>
@@ -4455,13 +4005,340 @@
           <a:p>
             <a:pPr algn="ctr"/>
             <a:r>
+              <a:rPr lang="en-US" sz="1100" b="1" dirty="0">
+                <a:solidFill>
+                  <a:prstClr val="black"/>
+                </a:solidFill>
+                <a:latin typeface="Calibri"/>
+              </a:rPr>
+              <a:t> 02C.06.01</a:t>
+            </a:r>
+          </a:p>
+          <a:p>
+            <a:pPr algn="ctr"/>
+            <a:r>
+              <a:rPr lang="en-US" sz="1100" b="1" dirty="0">
+                <a:solidFill>
+                  <a:prstClr val="black"/>
+                </a:solidFill>
+                <a:latin typeface="Calibri"/>
+              </a:rPr>
+              <a:t>Science Data Archive</a:t>
+            </a:r>
+          </a:p>
+          <a:p>
+            <a:pPr algn="ctr"/>
+            <a:r>
+              <a:rPr lang="en-US" sz="1100" b="1" dirty="0">
+                <a:solidFill>
+                  <a:prstClr val="black"/>
+                </a:solidFill>
+                <a:latin typeface="Calibri"/>
+              </a:rPr>
+              <a:t>(Images, Alerts, Catalogs)</a:t>
+            </a:r>
+          </a:p>
+        </p:txBody>
+      </p:sp>
+      <p:sp>
+        <p:nvSpPr>
+          <p:cNvPr id="27665" name="Rectangle 1069"/>
+          <p:cNvSpPr>
+            <a:spLocks noChangeArrowheads="1"/>
+          </p:cNvSpPr>
+          <p:nvPr/>
+        </p:nvSpPr>
+        <p:spPr bwMode="auto">
+          <a:xfrm>
+            <a:off x="6719254" y="1225929"/>
+            <a:ext cx="2184399" cy="761877"/>
+          </a:xfrm>
+          <a:prstGeom prst="rect">
+            <a:avLst/>
+          </a:prstGeom>
+          <a:solidFill>
+            <a:schemeClr val="tx2">
+              <a:lumMod val="40000"/>
+              <a:lumOff val="60000"/>
+            </a:schemeClr>
+          </a:solidFill>
+          <a:ln w="9525">
+            <a:solidFill>
+              <a:schemeClr val="tx1"/>
+            </a:solidFill>
+            <a:miter lim="800000"/>
+            <a:headEnd/>
+            <a:tailEnd/>
+          </a:ln>
+        </p:spPr>
+        <p:txBody>
+          <a:bodyPr wrap="none" anchor="ctr"/>
+          <a:lstStyle/>
+          <a:p>
+            <a:pPr algn="ctr"/>
+            <a:r>
+              <a:rPr lang="en-US" sz="1100" b="1" dirty="0" smtClean="0">
+                <a:solidFill>
+                  <a:prstClr val="black"/>
+                </a:solidFill>
+                <a:latin typeface="Calibri"/>
+              </a:rPr>
+              <a:t>02C.03</a:t>
+            </a:r>
+            <a:r>
+              <a:rPr lang="en-US" sz="1100" b="1" dirty="0">
+                <a:solidFill>
+                  <a:prstClr val="black"/>
+                </a:solidFill>
+                <a:latin typeface="Calibri"/>
+              </a:rPr>
+              <a:t>, 02C.04</a:t>
+            </a:r>
+          </a:p>
+          <a:p>
+            <a:pPr algn="ctr"/>
+            <a:r>
+              <a:rPr lang="en-US" sz="1100" b="1" dirty="0">
+                <a:solidFill>
+                  <a:prstClr val="black"/>
+                </a:solidFill>
+                <a:latin typeface="Calibri"/>
+              </a:rPr>
+              <a:t>Alert, </a:t>
+            </a:r>
+            <a:r>
+              <a:rPr lang="en-US" sz="1100" b="1" dirty="0" smtClean="0">
+                <a:solidFill>
+                  <a:prstClr val="black"/>
+                </a:solidFill>
+                <a:latin typeface="Calibri"/>
+              </a:rPr>
+              <a:t>Calibration, Data </a:t>
+            </a:r>
+            <a:r>
+              <a:rPr lang="en-US" sz="1100" b="1" dirty="0">
+                <a:solidFill>
+                  <a:prstClr val="black"/>
+                </a:solidFill>
+                <a:latin typeface="Calibri"/>
+              </a:rPr>
+              <a:t>Release </a:t>
+            </a:r>
+          </a:p>
+          <a:p>
+            <a:pPr algn="ctr"/>
+            <a:r>
+              <a:rPr lang="en-US" sz="1100" b="1" dirty="0" smtClean="0">
+                <a:solidFill>
+                  <a:prstClr val="black"/>
+                </a:solidFill>
+                <a:latin typeface="Calibri"/>
+              </a:rPr>
+              <a:t>Productions</a:t>
+            </a:r>
+            <a:endParaRPr lang="en-US" sz="1400" dirty="0">
+              <a:solidFill>
+                <a:prstClr val="black"/>
+              </a:solidFill>
+              <a:latin typeface="Calibri"/>
+            </a:endParaRPr>
+          </a:p>
+        </p:txBody>
+      </p:sp>
+      <p:sp>
+        <p:nvSpPr>
+          <p:cNvPr id="27666" name="Rectangle 1070"/>
+          <p:cNvSpPr>
+            <a:spLocks noChangeArrowheads="1"/>
+          </p:cNvSpPr>
+          <p:nvPr/>
+        </p:nvSpPr>
+        <p:spPr bwMode="auto">
+          <a:xfrm>
+            <a:off x="4404679" y="2657544"/>
+            <a:ext cx="4498975" cy="476127"/>
+          </a:xfrm>
+          <a:prstGeom prst="rect">
+            <a:avLst/>
+          </a:prstGeom>
+          <a:solidFill>
+            <a:schemeClr val="tx2">
+              <a:lumMod val="40000"/>
+              <a:lumOff val="60000"/>
+            </a:schemeClr>
+          </a:solidFill>
+          <a:ln w="9525">
+            <a:solidFill>
+              <a:schemeClr val="tx1"/>
+            </a:solidFill>
+            <a:miter lim="800000"/>
+            <a:headEnd/>
+            <a:tailEnd/>
+          </a:ln>
+        </p:spPr>
+        <p:txBody>
+          <a:bodyPr wrap="none" anchor="ctr"/>
+          <a:lstStyle/>
+          <a:p>
+            <a:pPr algn="ctr"/>
+            <a:r>
+              <a:rPr lang="en-US" sz="1100" b="1" dirty="0">
+                <a:solidFill>
+                  <a:prstClr val="black"/>
+                </a:solidFill>
+                <a:latin typeface="Calibri"/>
+              </a:rPr>
+              <a:t> 02C.03.05, </a:t>
+            </a:r>
+            <a:r>
+              <a:rPr lang="en-US" sz="1100" b="1" dirty="0">
+                <a:solidFill>
+                  <a:prstClr val="black"/>
+                </a:solidFill>
+                <a:latin typeface="Calibri"/>
+              </a:rPr>
+              <a:t>02C.04.01</a:t>
+            </a:r>
+            <a:endParaRPr lang="en-US" sz="1100" b="1" dirty="0">
+              <a:solidFill>
+                <a:prstClr val="black"/>
+              </a:solidFill>
+              <a:latin typeface="Calibri"/>
+            </a:endParaRPr>
+          </a:p>
+          <a:p>
+            <a:pPr algn="ctr"/>
+            <a:r>
+              <a:rPr lang="en-US" sz="1100" b="1" dirty="0">
+                <a:solidFill>
+                  <a:prstClr val="black"/>
+                </a:solidFill>
+                <a:latin typeface="Calibri"/>
+              </a:rPr>
+              <a:t>Shared Software Primitives</a:t>
+            </a:r>
+            <a:endParaRPr lang="en-US" sz="1100" b="1" dirty="0">
+              <a:solidFill>
+                <a:prstClr val="black"/>
+              </a:solidFill>
+              <a:latin typeface="Calibri"/>
+            </a:endParaRPr>
+          </a:p>
+        </p:txBody>
+      </p:sp>
+      <p:sp>
+        <p:nvSpPr>
+          <p:cNvPr id="27663" name="Rectangle 1070"/>
+          <p:cNvSpPr>
+            <a:spLocks noChangeArrowheads="1"/>
+          </p:cNvSpPr>
+          <p:nvPr/>
+        </p:nvSpPr>
+        <p:spPr bwMode="auto">
+          <a:xfrm>
+            <a:off x="4404679" y="1225929"/>
+            <a:ext cx="2314575" cy="761877"/>
+          </a:xfrm>
+          <a:prstGeom prst="rect">
+            <a:avLst/>
+          </a:prstGeom>
+          <a:solidFill>
+            <a:schemeClr val="tx2">
+              <a:lumMod val="40000"/>
+              <a:lumOff val="60000"/>
+            </a:schemeClr>
+          </a:solidFill>
+          <a:ln w="9525">
+            <a:solidFill>
+              <a:schemeClr val="tx1"/>
+            </a:solidFill>
+            <a:miter lim="800000"/>
+            <a:headEnd/>
+            <a:tailEnd/>
+          </a:ln>
+        </p:spPr>
+        <p:txBody>
+          <a:bodyPr wrap="none" anchor="ctr"/>
+          <a:lstStyle/>
+          <a:p>
+            <a:pPr algn="ctr"/>
+            <a:r>
+              <a:rPr lang="en-US" sz="1100" b="1" dirty="0">
+                <a:solidFill>
+                  <a:prstClr val="black"/>
+                </a:solidFill>
+                <a:latin typeface="Calibri"/>
+              </a:rPr>
+              <a:t> 02C.05</a:t>
+            </a:r>
+          </a:p>
+          <a:p>
+            <a:pPr algn="ctr"/>
+            <a:r>
+              <a:rPr lang="en-US" sz="1100" b="1" dirty="0">
+                <a:solidFill>
+                  <a:prstClr val="black"/>
+                </a:solidFill>
+                <a:latin typeface="Calibri"/>
+              </a:rPr>
+              <a:t>Science User Interface </a:t>
+            </a:r>
+          </a:p>
+          <a:p>
+            <a:pPr algn="ctr"/>
+            <a:r>
+              <a:rPr lang="en-US" sz="1100" b="1" dirty="0">
+                <a:solidFill>
+                  <a:prstClr val="black"/>
+                </a:solidFill>
+                <a:latin typeface="Calibri"/>
+              </a:rPr>
+              <a:t>and Analysis Tools</a:t>
+            </a:r>
+          </a:p>
+        </p:txBody>
+      </p:sp>
+      <p:sp>
+        <p:nvSpPr>
+          <p:cNvPr id="27659" name="Rectangle 1080"/>
+          <p:cNvSpPr>
+            <a:spLocks noChangeArrowheads="1"/>
+          </p:cNvSpPr>
+          <p:nvPr/>
+        </p:nvSpPr>
+        <p:spPr bwMode="auto">
+          <a:xfrm>
+            <a:off x="4404679" y="4786419"/>
+            <a:ext cx="1449388" cy="1031875"/>
+          </a:xfrm>
+          <a:prstGeom prst="rect">
+            <a:avLst/>
+          </a:prstGeom>
+          <a:solidFill>
+            <a:srgbClr val="FFF1BF"/>
+          </a:solidFill>
+          <a:ln w="9525">
+            <a:solidFill>
+              <a:schemeClr val="tx1"/>
+            </a:solidFill>
+            <a:miter lim="800000"/>
+            <a:headEnd/>
+            <a:tailEnd/>
+          </a:ln>
+        </p:spPr>
+        <p:txBody>
+          <a:bodyPr wrap="none" anchor="ctr"/>
+          <a:lstStyle/>
+          <a:p>
+            <a:pPr algn="ctr"/>
+            <a:r>
               <a:rPr lang="en-US" sz="1200" b="1" dirty="0">
                 <a:solidFill>
                   <a:prstClr val="black"/>
                 </a:solidFill>
                 <a:latin typeface="Calibri"/>
               </a:rPr>
-              <a:t> 02C.01.02.02 - 03</a:t>
+              <a:t> 02C.07.04.01</a:t>
             </a:r>
           </a:p>
           <a:p>
@@ -4473,19 +4350,7 @@
                 </a:solidFill>
                 <a:latin typeface="Calibri"/>
               </a:rPr>
-              <a:t>SDQA and</a:t>
-            </a:r>
-          </a:p>
-          <a:p>
-            <a:pPr algn="ctr"/>
-            <a:r>
-              <a:rPr lang="en-US" sz="1200" b="1" dirty="0">
-                <a:solidFill>
-                  <a:prstClr val="black"/>
-                </a:solidFill>
-                <a:latin typeface="Calibri"/>
-              </a:rPr>
-              <a:t> Science Pipeline Toolkits</a:t>
+              <a:t>Archive Site</a:t>
             </a:r>
             <a:endParaRPr lang="en-US" sz="1600" dirty="0">
               <a:solidFill>
@@ -4498,6 +4363,138 @@
       </p:sp>
       <p:sp>
         <p:nvSpPr>
+          <p:cNvPr id="27661" name="TextBox 18"/>
+          <p:cNvSpPr txBox="1">
+            <a:spLocks noChangeArrowheads="1"/>
+          </p:cNvSpPr>
+          <p:nvPr/>
+        </p:nvSpPr>
+        <p:spPr bwMode="auto">
+          <a:xfrm>
+            <a:off x="6409425" y="6172200"/>
+            <a:ext cx="2492865" cy="246221"/>
+          </a:xfrm>
+          <a:prstGeom prst="rect">
+            <a:avLst/>
+          </a:prstGeom>
+          <a:noFill/>
+          <a:ln w="9525">
+            <a:noFill/>
+            <a:miter lim="800000"/>
+            <a:headEnd/>
+            <a:tailEnd/>
+          </a:ln>
+        </p:spPr>
+        <p:txBody>
+          <a:bodyPr wrap="none">
+            <a:spAutoFit/>
+          </a:bodyPr>
+          <a:lstStyle/>
+          <a:p>
+            <a:r>
+              <a:rPr lang="en-US" sz="1000" i="1" dirty="0">
+                <a:solidFill>
+                  <a:prstClr val="black"/>
+                </a:solidFill>
+                <a:latin typeface="Calibri" pitchFamily="34" charset="0"/>
+              </a:rPr>
+              <a:t>Data Management System Design LDM-148</a:t>
+            </a:r>
+          </a:p>
+        </p:txBody>
+      </p:sp>
+      <p:sp>
+        <p:nvSpPr>
+          <p:cNvPr id="20" name="Rectangle 1070"/>
+          <p:cNvSpPr>
+            <a:spLocks noChangeArrowheads="1"/>
+          </p:cNvSpPr>
+          <p:nvPr/>
+        </p:nvSpPr>
+        <p:spPr bwMode="auto">
+          <a:xfrm>
+            <a:off x="4404679" y="791363"/>
+            <a:ext cx="4498973" cy="434566"/>
+          </a:xfrm>
+          <a:prstGeom prst="rect">
+            <a:avLst/>
+          </a:prstGeom>
+          <a:solidFill>
+            <a:schemeClr val="tx2">
+              <a:lumMod val="40000"/>
+              <a:lumOff val="60000"/>
+            </a:schemeClr>
+          </a:solidFill>
+          <a:ln w="9525">
+            <a:solidFill>
+              <a:schemeClr val="tx1"/>
+            </a:solidFill>
+            <a:miter lim="800000"/>
+            <a:headEnd/>
+            <a:tailEnd/>
+          </a:ln>
+        </p:spPr>
+        <p:txBody>
+          <a:bodyPr wrap="none" anchor="ctr"/>
+          <a:lstStyle/>
+          <a:p>
+            <a:pPr algn="ctr"/>
+            <a:r>
+              <a:rPr lang="en-US" sz="1100" b="1" dirty="0">
+                <a:solidFill>
+                  <a:prstClr val="black"/>
+                </a:solidFill>
+                <a:latin typeface="Calibri"/>
+              </a:rPr>
+              <a:t> </a:t>
+            </a:r>
+            <a:r>
+              <a:rPr lang="en-US" sz="1100" b="1" dirty="0">
+                <a:solidFill>
+                  <a:prstClr val="black"/>
+                </a:solidFill>
+                <a:latin typeface="Calibri"/>
+              </a:rPr>
+              <a:t>02C.01.02</a:t>
+            </a:r>
+            <a:endParaRPr lang="en-US" sz="1100" b="1" dirty="0">
+              <a:solidFill>
+                <a:prstClr val="black"/>
+              </a:solidFill>
+              <a:latin typeface="Calibri"/>
+            </a:endParaRPr>
+          </a:p>
+          <a:p>
+            <a:pPr algn="ctr"/>
+            <a:r>
+              <a:rPr lang="en-US" sz="1100" b="1" dirty="0">
+                <a:solidFill>
+                  <a:prstClr val="black"/>
+                </a:solidFill>
+                <a:latin typeface="Calibri"/>
+              </a:rPr>
+              <a:t>SDQA </a:t>
+            </a:r>
+            <a:r>
+              <a:rPr lang="en-US" sz="1100" b="1" dirty="0">
+                <a:solidFill>
+                  <a:prstClr val="black"/>
+                </a:solidFill>
+                <a:latin typeface="Calibri"/>
+              </a:rPr>
+              <a:t>System</a:t>
+            </a:r>
+            <a:endParaRPr lang="en-US" sz="1100" b="1" dirty="0">
+              <a:solidFill>
+                <a:prstClr val="black"/>
+              </a:solidFill>
+              <a:latin typeface="Calibri"/>
+            </a:endParaRPr>
+          </a:p>
+        </p:txBody>
+      </p:sp>
+      <p:sp>
+        <p:nvSpPr>
           <p:cNvPr id="4" name="Title 3"/>
           <p:cNvSpPr>
             <a:spLocks noGrp="1"/>
@@ -4511,7 +4508,61 @@
           <a:bodyPr/>
           <a:lstStyle/>
           <a:p>
-            <a:endParaRPr lang="en-US"/>
+            <a:endParaRPr lang="en-US" dirty="0"/>
+          </a:p>
+        </p:txBody>
+      </p:sp>
+      <p:sp>
+        <p:nvSpPr>
+          <p:cNvPr id="21" name="Rectangle 1070"/>
+          <p:cNvSpPr>
+            <a:spLocks noChangeArrowheads="1"/>
+          </p:cNvSpPr>
+          <p:nvPr/>
+        </p:nvSpPr>
+        <p:spPr bwMode="auto">
+          <a:xfrm>
+            <a:off x="6143574" y="1987805"/>
+            <a:ext cx="2760080" cy="672029"/>
+          </a:xfrm>
+          <a:prstGeom prst="rect">
+            <a:avLst/>
+          </a:prstGeom>
+          <a:solidFill>
+            <a:schemeClr val="tx2">
+              <a:lumMod val="40000"/>
+              <a:lumOff val="60000"/>
+            </a:schemeClr>
+          </a:solidFill>
+          <a:ln w="9525">
+            <a:solidFill>
+              <a:schemeClr val="tx1"/>
+            </a:solidFill>
+            <a:miter lim="800000"/>
+            <a:headEnd/>
+            <a:tailEnd/>
+          </a:ln>
+        </p:spPr>
+        <p:txBody>
+          <a:bodyPr wrap="none" anchor="ctr"/>
+          <a:lstStyle/>
+          <a:p>
+            <a:pPr algn="ctr"/>
+            <a:r>
+              <a:rPr lang="en-US" sz="1100" b="1" dirty="0">
+                <a:solidFill>
+                  <a:prstClr val="black"/>
+                </a:solidFill>
+                <a:latin typeface="Calibri"/>
+              </a:rPr>
+              <a:t>Algorithmic Components</a:t>
+            </a:r>
+            <a:endParaRPr lang="en-US" sz="1100" b="1" dirty="0">
+              <a:solidFill>
+                <a:prstClr val="black"/>
+              </a:solidFill>
+              <a:latin typeface="Calibri"/>
+            </a:endParaRPr>
           </a:p>
         </p:txBody>
       </p:sp>

</xml_diff>